<commit_message>
make ppt slide to image
</commit_message>
<xml_diff>
--- a/game_document/game.pptx
+++ b/game_document/game.pptx
@@ -124,9 +124,299 @@
 <file path=ppt/revisionInfo.xml><?xml version="1.0" encoding="utf-8"?>
 <p1510:revInfo xmlns:a="http://schemas.openxmlformats.org/drawingml/2006/main" xmlns:r="http://schemas.openxmlformats.org/officeDocument/2006/relationships" xmlns:p1510="http://schemas.microsoft.com/office/powerpoint/2015/10/main">
   <p1510:revLst>
-    <p1510:client id="{27C226C9-D6ED-0744-2413-EE53223F4543}" v="182" dt="2021-05-30T17:03:05.758"/>
+    <p1510:client id="{0299E396-A73B-420A-A0E8-8690949D8A8B}" v="30" dt="2021-06-24T07:38:14.697"/>
   </p1510:revLst>
 </p1510:revInfo>
+</file>
+
+<file path=ppt/changesInfos/changesInfo1.xml><?xml version="1.0" encoding="utf-8"?>
+<pc:chgInfo xmlns:a="http://schemas.openxmlformats.org/drawingml/2006/main" xmlns:r="http://schemas.openxmlformats.org/officeDocument/2006/relationships" xmlns:ac="http://schemas.microsoft.com/office/drawing/2013/main/command" xmlns:pc="http://schemas.microsoft.com/office/powerpoint/2013/main/command">
+  <pc:docChgLst>
+    <pc:chgData name="민기" userId="e40484f5e3d2a2ea" providerId="LiveId" clId="{0299E396-A73B-420A-A0E8-8690949D8A8B}"/>
+    <pc:docChg chg="custSel modSld">
+      <pc:chgData name="민기" userId="e40484f5e3d2a2ea" providerId="LiveId" clId="{0299E396-A73B-420A-A0E8-8690949D8A8B}" dt="2021-06-24T07:37:15.047" v="23" actId="27107"/>
+      <pc:docMkLst>
+        <pc:docMk/>
+      </pc:docMkLst>
+      <pc:sldChg chg="modSp mod">
+        <pc:chgData name="민기" userId="e40484f5e3d2a2ea" providerId="LiveId" clId="{0299E396-A73B-420A-A0E8-8690949D8A8B}" dt="2021-06-24T07:37:15.047" v="23" actId="27107"/>
+        <pc:sldMkLst>
+          <pc:docMk/>
+          <pc:sldMk cId="3888798496" sldId="257"/>
+        </pc:sldMkLst>
+        <pc:spChg chg="mod">
+          <ac:chgData name="민기" userId="e40484f5e3d2a2ea" providerId="LiveId" clId="{0299E396-A73B-420A-A0E8-8690949D8A8B}" dt="2021-06-24T07:37:15.047" v="23" actId="27107"/>
+          <ac:spMkLst>
+            <pc:docMk/>
+            <pc:sldMk cId="3888798496" sldId="257"/>
+            <ac:spMk id="3" creationId="{65EA216C-38D7-47E9-8ED3-8999D18361EA}"/>
+          </ac:spMkLst>
+        </pc:spChg>
+      </pc:sldChg>
+      <pc:sldChg chg="addSp delSp modSp mod">
+        <pc:chgData name="민기" userId="e40484f5e3d2a2ea" providerId="LiveId" clId="{0299E396-A73B-420A-A0E8-8690949D8A8B}" dt="2021-06-24T07:28:40.139" v="14" actId="1076"/>
+        <pc:sldMkLst>
+          <pc:docMk/>
+          <pc:sldMk cId="2605238361" sldId="258"/>
+        </pc:sldMkLst>
+        <pc:picChg chg="add mod">
+          <ac:chgData name="민기" userId="e40484f5e3d2a2ea" providerId="LiveId" clId="{0299E396-A73B-420A-A0E8-8690949D8A8B}" dt="2021-06-24T07:28:03.029" v="3" actId="1076"/>
+          <ac:picMkLst>
+            <pc:docMk/>
+            <pc:sldMk cId="2605238361" sldId="258"/>
+            <ac:picMk id="4" creationId="{0E6CF244-18F4-4917-9CA2-7121C9822BA1}"/>
+          </ac:picMkLst>
+        </pc:picChg>
+        <pc:picChg chg="add mod">
+          <ac:chgData name="민기" userId="e40484f5e3d2a2ea" providerId="LiveId" clId="{0299E396-A73B-420A-A0E8-8690949D8A8B}" dt="2021-06-24T07:28:11.428" v="5" actId="1076"/>
+          <ac:picMkLst>
+            <pc:docMk/>
+            <pc:sldMk cId="2605238361" sldId="258"/>
+            <ac:picMk id="8" creationId="{BE100982-E7CA-45C4-96DE-F27B8DD628B3}"/>
+          </ac:picMkLst>
+        </pc:picChg>
+        <pc:picChg chg="add del mod">
+          <ac:chgData name="민기" userId="e40484f5e3d2a2ea" providerId="LiveId" clId="{0299E396-A73B-420A-A0E8-8690949D8A8B}" dt="2021-06-24T07:28:26.964" v="10" actId="478"/>
+          <ac:picMkLst>
+            <pc:docMk/>
+            <pc:sldMk cId="2605238361" sldId="258"/>
+            <ac:picMk id="10" creationId="{A853E315-7F84-49B7-92D9-B2F5BA278245}"/>
+          </ac:picMkLst>
+        </pc:picChg>
+        <pc:picChg chg="add mod">
+          <ac:chgData name="민기" userId="e40484f5e3d2a2ea" providerId="LiveId" clId="{0299E396-A73B-420A-A0E8-8690949D8A8B}" dt="2021-06-24T07:28:24.486" v="8" actId="1076"/>
+          <ac:picMkLst>
+            <pc:docMk/>
+            <pc:sldMk cId="2605238361" sldId="258"/>
+            <ac:picMk id="12" creationId="{9CF77B1B-88AC-4082-8518-0B8F3EE01F70}"/>
+          </ac:picMkLst>
+        </pc:picChg>
+        <pc:picChg chg="add del mod">
+          <ac:chgData name="민기" userId="e40484f5e3d2a2ea" providerId="LiveId" clId="{0299E396-A73B-420A-A0E8-8690949D8A8B}" dt="2021-06-24T07:28:34.887" v="12"/>
+          <ac:picMkLst>
+            <pc:docMk/>
+            <pc:sldMk cId="2605238361" sldId="258"/>
+            <ac:picMk id="14" creationId="{EC9B8201-F96D-42AA-8561-E6BF99D528EA}"/>
+          </ac:picMkLst>
+        </pc:picChg>
+        <pc:picChg chg="add mod">
+          <ac:chgData name="민기" userId="e40484f5e3d2a2ea" providerId="LiveId" clId="{0299E396-A73B-420A-A0E8-8690949D8A8B}" dt="2021-06-24T07:28:40.139" v="14" actId="1076"/>
+          <ac:picMkLst>
+            <pc:docMk/>
+            <pc:sldMk cId="2605238361" sldId="258"/>
+            <ac:picMk id="16" creationId="{1489B055-D3DE-46F6-B9A6-D4E4D5188466}"/>
+          </ac:picMkLst>
+        </pc:picChg>
+        <pc:picChg chg="del">
+          <ac:chgData name="민기" userId="e40484f5e3d2a2ea" providerId="LiveId" clId="{0299E396-A73B-420A-A0E8-8690949D8A8B}" dt="2021-06-24T07:28:01.197" v="2" actId="478"/>
+          <ac:picMkLst>
+            <pc:docMk/>
+            <pc:sldMk cId="2605238361" sldId="258"/>
+            <ac:picMk id="90" creationId="{0AF83807-D9AC-44BE-8793-9332C79C303D}"/>
+          </ac:picMkLst>
+        </pc:picChg>
+        <pc:picChg chg="del">
+          <ac:chgData name="민기" userId="e40484f5e3d2a2ea" providerId="LiveId" clId="{0299E396-A73B-420A-A0E8-8690949D8A8B}" dt="2021-06-24T07:28:01.197" v="2" actId="478"/>
+          <ac:picMkLst>
+            <pc:docMk/>
+            <pc:sldMk cId="2605238361" sldId="258"/>
+            <ac:picMk id="91" creationId="{47F5FA23-CDA7-4F68-91C0-8A0058FA536E}"/>
+          </ac:picMkLst>
+        </pc:picChg>
+        <pc:picChg chg="del">
+          <ac:chgData name="민기" userId="e40484f5e3d2a2ea" providerId="LiveId" clId="{0299E396-A73B-420A-A0E8-8690949D8A8B}" dt="2021-06-24T07:28:01.197" v="2" actId="478"/>
+          <ac:picMkLst>
+            <pc:docMk/>
+            <pc:sldMk cId="2605238361" sldId="258"/>
+            <ac:picMk id="92" creationId="{77FA0065-6F25-4175-96AD-39CD883F688C}"/>
+          </ac:picMkLst>
+        </pc:picChg>
+        <pc:picChg chg="del">
+          <ac:chgData name="민기" userId="e40484f5e3d2a2ea" providerId="LiveId" clId="{0299E396-A73B-420A-A0E8-8690949D8A8B}" dt="2021-06-24T07:28:01.197" v="2" actId="478"/>
+          <ac:picMkLst>
+            <pc:docMk/>
+            <pc:sldMk cId="2605238361" sldId="258"/>
+            <ac:picMk id="93" creationId="{5E25A1D9-00CF-4D0F-8FDD-273A90B28E0A}"/>
+          </ac:picMkLst>
+        </pc:picChg>
+      </pc:sldChg>
+      <pc:sldChg chg="addSp delSp modSp mod">
+        <pc:chgData name="민기" userId="e40484f5e3d2a2ea" providerId="LiveId" clId="{0299E396-A73B-420A-A0E8-8690949D8A8B}" dt="2021-06-24T07:29:21.376" v="19" actId="1076"/>
+        <pc:sldMkLst>
+          <pc:docMk/>
+          <pc:sldMk cId="897349624" sldId="259"/>
+        </pc:sldMkLst>
+        <pc:picChg chg="del">
+          <ac:chgData name="민기" userId="e40484f5e3d2a2ea" providerId="LiveId" clId="{0299E396-A73B-420A-A0E8-8690949D8A8B}" dt="2021-06-24T07:29:19.218" v="17" actId="478"/>
+          <ac:picMkLst>
+            <pc:docMk/>
+            <pc:sldMk cId="897349624" sldId="259"/>
+            <ac:picMk id="39" creationId="{34EB6B3C-E7D1-4BB9-AE3F-297B7FA060C3}"/>
+          </ac:picMkLst>
+        </pc:picChg>
+        <pc:picChg chg="del">
+          <ac:chgData name="민기" userId="e40484f5e3d2a2ea" providerId="LiveId" clId="{0299E396-A73B-420A-A0E8-8690949D8A8B}" dt="2021-06-24T07:29:19.218" v="17" actId="478"/>
+          <ac:picMkLst>
+            <pc:docMk/>
+            <pc:sldMk cId="897349624" sldId="259"/>
+            <ac:picMk id="40" creationId="{DFE3BF2A-3C57-45AE-B222-B1427E2C1CF6}"/>
+          </ac:picMkLst>
+        </pc:picChg>
+        <pc:picChg chg="del">
+          <ac:chgData name="민기" userId="e40484f5e3d2a2ea" providerId="LiveId" clId="{0299E396-A73B-420A-A0E8-8690949D8A8B}" dt="2021-06-24T07:29:19.218" v="17" actId="478"/>
+          <ac:picMkLst>
+            <pc:docMk/>
+            <pc:sldMk cId="897349624" sldId="259"/>
+            <ac:picMk id="41" creationId="{DC1EA012-FFE5-4E84-A8C7-C5596D2D0790}"/>
+          </ac:picMkLst>
+        </pc:picChg>
+        <pc:picChg chg="del">
+          <ac:chgData name="민기" userId="e40484f5e3d2a2ea" providerId="LiveId" clId="{0299E396-A73B-420A-A0E8-8690949D8A8B}" dt="2021-06-24T07:29:19.218" v="17" actId="478"/>
+          <ac:picMkLst>
+            <pc:docMk/>
+            <pc:sldMk cId="897349624" sldId="259"/>
+            <ac:picMk id="42" creationId="{257D61FA-A6B2-4192-BDAA-AFDA54515DA6}"/>
+          </ac:picMkLst>
+        </pc:picChg>
+        <pc:picChg chg="add del mod">
+          <ac:chgData name="민기" userId="e40484f5e3d2a2ea" providerId="LiveId" clId="{0299E396-A73B-420A-A0E8-8690949D8A8B}" dt="2021-06-24T07:29:13.848" v="16"/>
+          <ac:picMkLst>
+            <pc:docMk/>
+            <pc:sldMk cId="897349624" sldId="259"/>
+            <ac:picMk id="43" creationId="{7F96EB13-7131-47FB-B4AF-2A7C9208BCF8}"/>
+          </ac:picMkLst>
+        </pc:picChg>
+        <pc:picChg chg="add del mod">
+          <ac:chgData name="민기" userId="e40484f5e3d2a2ea" providerId="LiveId" clId="{0299E396-A73B-420A-A0E8-8690949D8A8B}" dt="2021-06-24T07:29:13.848" v="16"/>
+          <ac:picMkLst>
+            <pc:docMk/>
+            <pc:sldMk cId="897349624" sldId="259"/>
+            <ac:picMk id="44" creationId="{4356D82F-5F7F-47FE-BB0B-A7A4F68C203E}"/>
+          </ac:picMkLst>
+        </pc:picChg>
+        <pc:picChg chg="add del mod">
+          <ac:chgData name="민기" userId="e40484f5e3d2a2ea" providerId="LiveId" clId="{0299E396-A73B-420A-A0E8-8690949D8A8B}" dt="2021-06-24T07:29:13.848" v="16"/>
+          <ac:picMkLst>
+            <pc:docMk/>
+            <pc:sldMk cId="897349624" sldId="259"/>
+            <ac:picMk id="45" creationId="{18C71037-A43D-4C88-A58F-D9B6A54EF50A}"/>
+          </ac:picMkLst>
+        </pc:picChg>
+        <pc:picChg chg="add del mod">
+          <ac:chgData name="민기" userId="e40484f5e3d2a2ea" providerId="LiveId" clId="{0299E396-A73B-420A-A0E8-8690949D8A8B}" dt="2021-06-24T07:29:13.848" v="16"/>
+          <ac:picMkLst>
+            <pc:docMk/>
+            <pc:sldMk cId="897349624" sldId="259"/>
+            <ac:picMk id="46" creationId="{2BE53169-4275-4020-B71D-363433FB9F36}"/>
+          </ac:picMkLst>
+        </pc:picChg>
+        <pc:picChg chg="add mod">
+          <ac:chgData name="민기" userId="e40484f5e3d2a2ea" providerId="LiveId" clId="{0299E396-A73B-420A-A0E8-8690949D8A8B}" dt="2021-06-24T07:29:21.376" v="19" actId="1076"/>
+          <ac:picMkLst>
+            <pc:docMk/>
+            <pc:sldMk cId="897349624" sldId="259"/>
+            <ac:picMk id="47" creationId="{1879A1DE-2541-414F-A04F-4670185C3A1B}"/>
+          </ac:picMkLst>
+        </pc:picChg>
+        <pc:picChg chg="add mod">
+          <ac:chgData name="민기" userId="e40484f5e3d2a2ea" providerId="LiveId" clId="{0299E396-A73B-420A-A0E8-8690949D8A8B}" dt="2021-06-24T07:29:21.376" v="19" actId="1076"/>
+          <ac:picMkLst>
+            <pc:docMk/>
+            <pc:sldMk cId="897349624" sldId="259"/>
+            <ac:picMk id="48" creationId="{CEFA87CA-ACD1-425F-98EE-FBF05133B795}"/>
+          </ac:picMkLst>
+        </pc:picChg>
+        <pc:picChg chg="add mod">
+          <ac:chgData name="민기" userId="e40484f5e3d2a2ea" providerId="LiveId" clId="{0299E396-A73B-420A-A0E8-8690949D8A8B}" dt="2021-06-24T07:29:21.376" v="19" actId="1076"/>
+          <ac:picMkLst>
+            <pc:docMk/>
+            <pc:sldMk cId="897349624" sldId="259"/>
+            <ac:picMk id="49" creationId="{33C50761-B9D3-42CD-BFFE-18575899D6DC}"/>
+          </ac:picMkLst>
+        </pc:picChg>
+        <pc:picChg chg="add mod">
+          <ac:chgData name="민기" userId="e40484f5e3d2a2ea" providerId="LiveId" clId="{0299E396-A73B-420A-A0E8-8690949D8A8B}" dt="2021-06-24T07:29:21.376" v="19" actId="1076"/>
+          <ac:picMkLst>
+            <pc:docMk/>
+            <pc:sldMk cId="897349624" sldId="259"/>
+            <ac:picMk id="50" creationId="{7F2A389E-8404-44A4-8690-E26606D98185}"/>
+          </ac:picMkLst>
+        </pc:picChg>
+      </pc:sldChg>
+      <pc:sldChg chg="addSp delSp modSp mod">
+        <pc:chgData name="민기" userId="e40484f5e3d2a2ea" providerId="LiveId" clId="{0299E396-A73B-420A-A0E8-8690949D8A8B}" dt="2021-06-24T07:29:31.096" v="22" actId="1076"/>
+        <pc:sldMkLst>
+          <pc:docMk/>
+          <pc:sldMk cId="1376619610" sldId="260"/>
+        </pc:sldMkLst>
+        <pc:picChg chg="add mod">
+          <ac:chgData name="민기" userId="e40484f5e3d2a2ea" providerId="LiveId" clId="{0299E396-A73B-420A-A0E8-8690949D8A8B}" dt="2021-06-24T07:29:31.096" v="22" actId="1076"/>
+          <ac:picMkLst>
+            <pc:docMk/>
+            <pc:sldMk cId="1376619610" sldId="260"/>
+            <ac:picMk id="36" creationId="{EEA1850D-FE5A-453F-9C57-D8A58401FA17}"/>
+          </ac:picMkLst>
+        </pc:picChg>
+        <pc:picChg chg="add mod">
+          <ac:chgData name="민기" userId="e40484f5e3d2a2ea" providerId="LiveId" clId="{0299E396-A73B-420A-A0E8-8690949D8A8B}" dt="2021-06-24T07:29:31.096" v="22" actId="1076"/>
+          <ac:picMkLst>
+            <pc:docMk/>
+            <pc:sldMk cId="1376619610" sldId="260"/>
+            <ac:picMk id="38" creationId="{1C1D4672-E2CA-480B-8EC2-DA0C341B490B}"/>
+          </ac:picMkLst>
+        </pc:picChg>
+        <pc:picChg chg="del">
+          <ac:chgData name="민기" userId="e40484f5e3d2a2ea" providerId="LiveId" clId="{0299E396-A73B-420A-A0E8-8690949D8A8B}" dt="2021-06-24T07:29:26.295" v="20" actId="478"/>
+          <ac:picMkLst>
+            <pc:docMk/>
+            <pc:sldMk cId="1376619610" sldId="260"/>
+            <ac:picMk id="41" creationId="{15233880-F4E0-4337-A500-E20FDC77E0C8}"/>
+          </ac:picMkLst>
+        </pc:picChg>
+        <pc:picChg chg="del">
+          <ac:chgData name="민기" userId="e40484f5e3d2a2ea" providerId="LiveId" clId="{0299E396-A73B-420A-A0E8-8690949D8A8B}" dt="2021-06-24T07:29:26.295" v="20" actId="478"/>
+          <ac:picMkLst>
+            <pc:docMk/>
+            <pc:sldMk cId="1376619610" sldId="260"/>
+            <ac:picMk id="42" creationId="{515BD7B2-DF08-42AE-9923-B61BCEB445F6}"/>
+          </ac:picMkLst>
+        </pc:picChg>
+        <pc:picChg chg="del">
+          <ac:chgData name="민기" userId="e40484f5e3d2a2ea" providerId="LiveId" clId="{0299E396-A73B-420A-A0E8-8690949D8A8B}" dt="2021-06-24T07:29:26.295" v="20" actId="478"/>
+          <ac:picMkLst>
+            <pc:docMk/>
+            <pc:sldMk cId="1376619610" sldId="260"/>
+            <ac:picMk id="43" creationId="{BC47DED8-196E-47DA-97F6-3AE717111D88}"/>
+          </ac:picMkLst>
+        </pc:picChg>
+        <pc:picChg chg="del">
+          <ac:chgData name="민기" userId="e40484f5e3d2a2ea" providerId="LiveId" clId="{0299E396-A73B-420A-A0E8-8690949D8A8B}" dt="2021-06-24T07:29:26.295" v="20" actId="478"/>
+          <ac:picMkLst>
+            <pc:docMk/>
+            <pc:sldMk cId="1376619610" sldId="260"/>
+            <ac:picMk id="44" creationId="{B3C89FD6-231C-4EAD-8F68-4C54297E3AFA}"/>
+          </ac:picMkLst>
+        </pc:picChg>
+        <pc:picChg chg="add mod">
+          <ac:chgData name="민기" userId="e40484f5e3d2a2ea" providerId="LiveId" clId="{0299E396-A73B-420A-A0E8-8690949D8A8B}" dt="2021-06-24T07:29:31.096" v="22" actId="1076"/>
+          <ac:picMkLst>
+            <pc:docMk/>
+            <pc:sldMk cId="1376619610" sldId="260"/>
+            <ac:picMk id="45" creationId="{9B8CB750-323D-4930-BC98-98CD0D4A629D}"/>
+          </ac:picMkLst>
+        </pc:picChg>
+        <pc:picChg chg="add mod">
+          <ac:chgData name="민기" userId="e40484f5e3d2a2ea" providerId="LiveId" clId="{0299E396-A73B-420A-A0E8-8690949D8A8B}" dt="2021-06-24T07:29:31.096" v="22" actId="1076"/>
+          <ac:picMkLst>
+            <pc:docMk/>
+            <pc:sldMk cId="1376619610" sldId="260"/>
+            <ac:picMk id="46" creationId="{5448DEB3-3ED7-4CD3-834C-A667D9490578}"/>
+          </ac:picMkLst>
+        </pc:picChg>
+      </pc:sldChg>
+    </pc:docChg>
+  </pc:docChgLst>
+</pc:chgInfo>
 </file>
 
 <file path=ppt/slideLayouts/slideLayout1.xml><?xml version="1.0" encoding="utf-8"?>
@@ -276,7 +566,7 @@
           <a:p>
             <a:fld id="{EBDDD97A-DE87-4666-930A-990821E27897}" type="datetimeFigureOut">
               <a:rPr lang="ko-KR" altLang="en-US" smtClean="0"/>
-              <a:t>2021-05-31</a:t>
+              <a:t>2021-06-24</a:t>
             </a:fld>
             <a:endParaRPr lang="ko-KR" altLang="en-US"/>
           </a:p>
@@ -474,7 +764,7 @@
           <a:p>
             <a:fld id="{EBDDD97A-DE87-4666-930A-990821E27897}" type="datetimeFigureOut">
               <a:rPr lang="ko-KR" altLang="en-US" smtClean="0"/>
-              <a:t>2021-05-31</a:t>
+              <a:t>2021-06-24</a:t>
             </a:fld>
             <a:endParaRPr lang="ko-KR" altLang="en-US"/>
           </a:p>
@@ -682,7 +972,7 @@
           <a:p>
             <a:fld id="{EBDDD97A-DE87-4666-930A-990821E27897}" type="datetimeFigureOut">
               <a:rPr lang="ko-KR" altLang="en-US" smtClean="0"/>
-              <a:t>2021-05-31</a:t>
+              <a:t>2021-06-24</a:t>
             </a:fld>
             <a:endParaRPr lang="ko-KR" altLang="en-US"/>
           </a:p>
@@ -880,7 +1170,7 @@
           <a:p>
             <a:fld id="{EBDDD97A-DE87-4666-930A-990821E27897}" type="datetimeFigureOut">
               <a:rPr lang="ko-KR" altLang="en-US" smtClean="0"/>
-              <a:t>2021-05-31</a:t>
+              <a:t>2021-06-24</a:t>
             </a:fld>
             <a:endParaRPr lang="ko-KR" altLang="en-US"/>
           </a:p>
@@ -1155,7 +1445,7 @@
           <a:p>
             <a:fld id="{EBDDD97A-DE87-4666-930A-990821E27897}" type="datetimeFigureOut">
               <a:rPr lang="ko-KR" altLang="en-US" smtClean="0"/>
-              <a:t>2021-05-31</a:t>
+              <a:t>2021-06-24</a:t>
             </a:fld>
             <a:endParaRPr lang="ko-KR" altLang="en-US"/>
           </a:p>
@@ -1420,7 +1710,7 @@
           <a:p>
             <a:fld id="{EBDDD97A-DE87-4666-930A-990821E27897}" type="datetimeFigureOut">
               <a:rPr lang="ko-KR" altLang="en-US" smtClean="0"/>
-              <a:t>2021-05-31</a:t>
+              <a:t>2021-06-24</a:t>
             </a:fld>
             <a:endParaRPr lang="ko-KR" altLang="en-US"/>
           </a:p>
@@ -1832,7 +2122,7 @@
           <a:p>
             <a:fld id="{EBDDD97A-DE87-4666-930A-990821E27897}" type="datetimeFigureOut">
               <a:rPr lang="ko-KR" altLang="en-US" smtClean="0"/>
-              <a:t>2021-05-31</a:t>
+              <a:t>2021-06-24</a:t>
             </a:fld>
             <a:endParaRPr lang="ko-KR" altLang="en-US"/>
           </a:p>
@@ -1973,7 +2263,7 @@
           <a:p>
             <a:fld id="{EBDDD97A-DE87-4666-930A-990821E27897}" type="datetimeFigureOut">
               <a:rPr lang="ko-KR" altLang="en-US" smtClean="0"/>
-              <a:t>2021-05-31</a:t>
+              <a:t>2021-06-24</a:t>
             </a:fld>
             <a:endParaRPr lang="ko-KR" altLang="en-US"/>
           </a:p>
@@ -2086,7 +2376,7 @@
           <a:p>
             <a:fld id="{EBDDD97A-DE87-4666-930A-990821E27897}" type="datetimeFigureOut">
               <a:rPr lang="ko-KR" altLang="en-US" smtClean="0"/>
-              <a:t>2021-05-31</a:t>
+              <a:t>2021-06-24</a:t>
             </a:fld>
             <a:endParaRPr lang="ko-KR" altLang="en-US"/>
           </a:p>
@@ -2397,7 +2687,7 @@
           <a:p>
             <a:fld id="{EBDDD97A-DE87-4666-930A-990821E27897}" type="datetimeFigureOut">
               <a:rPr lang="ko-KR" altLang="en-US" smtClean="0"/>
-              <a:t>2021-05-31</a:t>
+              <a:t>2021-06-24</a:t>
             </a:fld>
             <a:endParaRPr lang="ko-KR" altLang="en-US"/>
           </a:p>
@@ -2685,7 +2975,7 @@
           <a:p>
             <a:fld id="{EBDDD97A-DE87-4666-930A-990821E27897}" type="datetimeFigureOut">
               <a:rPr lang="ko-KR" altLang="en-US" smtClean="0"/>
-              <a:t>2021-05-31</a:t>
+              <a:t>2021-06-24</a:t>
             </a:fld>
             <a:endParaRPr lang="ko-KR" altLang="en-US"/>
           </a:p>
@@ -2926,7 +3216,7 @@
           <a:p>
             <a:fld id="{EBDDD97A-DE87-4666-930A-990821E27897}" type="datetimeFigureOut">
               <a:rPr lang="ko-KR" altLang="en-US" smtClean="0"/>
-              <a:t>2021-05-31</a:t>
+              <a:t>2021-06-24</a:t>
             </a:fld>
             <a:endParaRPr lang="ko-KR" altLang="en-US"/>
           </a:p>
@@ -5502,52 +5792,10 @@
           <a:lstStyle/>
           <a:p>
             <a:r>
-              <a:rPr lang="ko-KR" altLang="en-US" dirty="0" err="1">
-                <a:ea typeface="맑은 고딕"/>
-              </a:rPr>
-              <a:t>What</a:t>
-            </a:r>
-            <a:r>
               <a:rPr lang="ko-KR" altLang="en-US" dirty="0">
                 <a:ea typeface="맑은 고딕"/>
               </a:rPr>
-              <a:t> </a:t>
-            </a:r>
-            <a:r>
-              <a:rPr lang="ko-KR" altLang="en-US" dirty="0" err="1">
-                <a:ea typeface="맑은 고딕"/>
-              </a:rPr>
-              <a:t>should</a:t>
-            </a:r>
-            <a:r>
-              <a:rPr lang="ko-KR" altLang="en-US" dirty="0">
-                <a:ea typeface="맑은 고딕"/>
-              </a:rPr>
-              <a:t> </a:t>
-            </a:r>
-            <a:r>
-              <a:rPr lang="ko-KR" altLang="en-US" dirty="0" err="1">
-                <a:ea typeface="맑은 고딕"/>
-              </a:rPr>
-              <a:t>we</a:t>
-            </a:r>
-            <a:r>
-              <a:rPr lang="ko-KR" altLang="en-US" dirty="0">
-                <a:ea typeface="맑은 고딕"/>
-              </a:rPr>
-              <a:t> </a:t>
-            </a:r>
-            <a:r>
-              <a:rPr lang="ko-KR" altLang="en-US" dirty="0" err="1">
-                <a:ea typeface="맑은 고딕"/>
-              </a:rPr>
-              <a:t>do</a:t>
-            </a:r>
-            <a:r>
-              <a:rPr lang="ko-KR" altLang="en-US" dirty="0">
-                <a:ea typeface="맑은 고딕"/>
-              </a:rPr>
-              <a:t>?</a:t>
+              <a:t>What should we do?</a:t>
             </a:r>
           </a:p>
         </p:txBody>
@@ -5576,62 +5824,20 @@
           <a:lstStyle/>
           <a:p>
             <a:r>
-              <a:rPr lang="ko-KR" dirty="0" err="1">
-                <a:ea typeface="+mn-lt"/>
-                <a:cs typeface="+mn-lt"/>
-              </a:rPr>
-              <a:t>Player</a:t>
-            </a:r>
-            <a:r>
               <a:rPr lang="ko-KR" dirty="0">
                 <a:ea typeface="+mn-lt"/>
                 <a:cs typeface="+mn-lt"/>
               </a:rPr>
-              <a:t>, AI, </a:t>
+              <a:t>Player, AI, Zombie character design</a:t>
             </a:r>
-            <a:r>
-              <a:rPr lang="ko-KR" dirty="0" err="1">
-                <a:ea typeface="+mn-lt"/>
-                <a:cs typeface="+mn-lt"/>
-              </a:rPr>
-              <a:t>Zombie</a:t>
-            </a:r>
-            <a:r>
-              <a:rPr lang="ko-KR" dirty="0">
-                <a:ea typeface="+mn-lt"/>
-                <a:cs typeface="+mn-lt"/>
-              </a:rPr>
-              <a:t> </a:t>
-            </a:r>
-            <a:r>
-              <a:rPr lang="ko-KR" dirty="0" err="1">
-                <a:ea typeface="+mn-lt"/>
-                <a:cs typeface="+mn-lt"/>
-              </a:rPr>
-              <a:t>character</a:t>
-            </a:r>
-            <a:r>
-              <a:rPr lang="ko-KR" dirty="0">
-                <a:ea typeface="+mn-lt"/>
-                <a:cs typeface="+mn-lt"/>
-              </a:rPr>
-              <a:t> </a:t>
-            </a:r>
-            <a:r>
-              <a:rPr lang="ko-KR" dirty="0" err="1">
-                <a:ea typeface="+mn-lt"/>
-                <a:cs typeface="+mn-lt"/>
-              </a:rPr>
-              <a:t>design</a:t>
-            </a:r>
-            <a:endParaRPr lang="ko-KR" altLang="en-US" dirty="0" err="1"/>
+            <a:endParaRPr lang="ko-KR" altLang="en-US" dirty="0"/>
           </a:p>
           <a:p>
-            <a:endParaRPr lang="ko-KR"/>
+            <a:endParaRPr lang="ko-KR" dirty="0"/>
           </a:p>
           <a:p>
             <a:r>
-              <a:rPr lang="ko-KR" dirty="0" err="1">
+              <a:rPr lang="ko-KR" dirty="0">
                 <a:ea typeface="+mn-lt"/>
                 <a:cs typeface="+mn-lt"/>
               </a:rPr>
@@ -5655,124 +5861,13 @@
           </a:p>
           <a:p>
             <a:r>
-              <a:rPr lang="ko-KR" dirty="0" err="1">
-                <a:ea typeface="+mn-lt"/>
-                <a:cs typeface="+mn-lt"/>
-              </a:rPr>
-              <a:t>Drawing</a:t>
-            </a:r>
-            <a:r>
               <a:rPr lang="ko-KR" dirty="0">
                 <a:ea typeface="+mn-lt"/>
                 <a:cs typeface="+mn-lt"/>
               </a:rPr>
-              <a:t> </a:t>
-            </a:r>
-            <a:r>
-              <a:rPr lang="ko-KR" dirty="0" err="1">
-                <a:ea typeface="+mn-lt"/>
-                <a:cs typeface="+mn-lt"/>
-              </a:rPr>
-              <a:t>map</a:t>
-            </a:r>
-            <a:r>
-              <a:rPr lang="ko-KR" dirty="0">
-                <a:ea typeface="+mn-lt"/>
-                <a:cs typeface="+mn-lt"/>
-              </a:rPr>
-              <a:t> and </a:t>
-            </a:r>
-            <a:r>
-              <a:rPr lang="ko-KR" dirty="0" err="1">
-                <a:ea typeface="+mn-lt"/>
-                <a:cs typeface="+mn-lt"/>
-              </a:rPr>
-              <a:t>character</a:t>
-            </a:r>
-            <a:r>
-              <a:rPr lang="ko-KR" dirty="0">
-                <a:ea typeface="+mn-lt"/>
-                <a:cs typeface="+mn-lt"/>
-              </a:rPr>
-              <a:t>(</a:t>
-            </a:r>
-            <a:r>
-              <a:rPr lang="ko-KR" dirty="0" err="1">
-                <a:ea typeface="+mn-lt"/>
-                <a:cs typeface="+mn-lt"/>
-              </a:rPr>
-              <a:t>including</a:t>
-            </a:r>
-            <a:r>
-              <a:rPr lang="ko-KR" dirty="0">
-                <a:ea typeface="+mn-lt"/>
-                <a:cs typeface="+mn-lt"/>
-              </a:rPr>
-              <a:t> </a:t>
-            </a:r>
-            <a:r>
-              <a:rPr lang="ko-KR" dirty="0" err="1">
-                <a:ea typeface="+mn-lt"/>
-                <a:cs typeface="+mn-lt"/>
-              </a:rPr>
-              <a:t>zombies</a:t>
-            </a:r>
-            <a:r>
-              <a:rPr lang="ko-KR" dirty="0">
-                <a:ea typeface="+mn-lt"/>
-                <a:cs typeface="+mn-lt"/>
-              </a:rPr>
-              <a:t>)</a:t>
+              <a:t>Drawing map and character(including zombies)</a:t>
             </a:r>
             <a:endParaRPr lang="ko-KR" dirty="0"/>
-          </a:p>
-          <a:p>
-            <a:r>
-              <a:rPr lang="ko-KR" dirty="0" err="1">
-                <a:ea typeface="+mn-lt"/>
-                <a:cs typeface="+mn-lt"/>
-              </a:rPr>
-              <a:t>Zombie</a:t>
-            </a:r>
-            <a:r>
-              <a:rPr lang="ko-KR" dirty="0">
-                <a:ea typeface="+mn-lt"/>
-                <a:cs typeface="+mn-lt"/>
-              </a:rPr>
-              <a:t> </a:t>
-            </a:r>
-            <a:r>
-              <a:rPr lang="ko-KR" dirty="0" err="1">
-                <a:ea typeface="+mn-lt"/>
-                <a:cs typeface="+mn-lt"/>
-              </a:rPr>
-              <a:t>movement</a:t>
-            </a:r>
-            <a:endParaRPr lang="ko-KR" dirty="0" err="1"/>
-          </a:p>
-          <a:p>
-            <a:r>
-              <a:rPr lang="ko-KR" dirty="0" err="1">
-                <a:ea typeface="+mn-lt"/>
-                <a:cs typeface="+mn-lt"/>
-              </a:rPr>
-              <a:t>Player</a:t>
-            </a:r>
-            <a:r>
-              <a:rPr lang="ko-KR" dirty="0">
-                <a:ea typeface="+mn-lt"/>
-                <a:cs typeface="+mn-lt"/>
-              </a:rPr>
-              <a:t> </a:t>
-            </a:r>
-            <a:r>
-              <a:rPr lang="ko-KR" dirty="0" err="1">
-                <a:ea typeface="+mn-lt"/>
-                <a:cs typeface="+mn-lt"/>
-              </a:rPr>
-              <a:t>shooting</a:t>
-            </a:r>
-            <a:endParaRPr lang="ko-KR" dirty="0" err="1"/>
           </a:p>
           <a:p>
             <a:r>
@@ -5780,64 +5875,49 @@
                 <a:ea typeface="+mn-lt"/>
                 <a:cs typeface="+mn-lt"/>
               </a:rPr>
-              <a:t>AI </a:t>
+              <a:t>Zombie movement</a:t>
             </a:r>
-            <a:r>
-              <a:rPr lang="ko-KR" dirty="0" err="1">
-                <a:ea typeface="+mn-lt"/>
-                <a:cs typeface="+mn-lt"/>
-              </a:rPr>
-              <a:t>shooting</a:t>
-            </a:r>
-            <a:endParaRPr lang="ko-KR" dirty="0" err="1"/>
+            <a:endParaRPr lang="ko-KR" dirty="0"/>
           </a:p>
           <a:p>
-            <a:r>
-              <a:rPr lang="ko-KR" dirty="0" err="1">
-                <a:ea typeface="+mn-lt"/>
-                <a:cs typeface="+mn-lt"/>
-              </a:rPr>
-              <a:t>Pick</a:t>
-            </a:r>
             <a:r>
               <a:rPr lang="ko-KR" dirty="0">
                 <a:ea typeface="+mn-lt"/>
                 <a:cs typeface="+mn-lt"/>
               </a:rPr>
-              <a:t> and </a:t>
+              <a:t>Player shooting</a:t>
             </a:r>
-            <a:r>
-              <a:rPr lang="ko-KR" dirty="0" err="1">
-                <a:ea typeface="+mn-lt"/>
-                <a:cs typeface="+mn-lt"/>
-              </a:rPr>
-              <a:t>Ban</a:t>
-            </a:r>
+            <a:endParaRPr lang="ko-KR" dirty="0"/>
+          </a:p>
+          <a:p>
             <a:r>
               <a:rPr lang="ko-KR" dirty="0">
                 <a:ea typeface="+mn-lt"/>
                 <a:cs typeface="+mn-lt"/>
               </a:rPr>
-              <a:t> </a:t>
+              <a:t>AI shooting</a:t>
             </a:r>
+            <a:endParaRPr lang="ko-KR" dirty="0"/>
+          </a:p>
+          <a:p>
             <a:r>
-              <a:rPr lang="ko-KR" dirty="0" err="1">
+              <a:rPr lang="ko-KR" dirty="0">
                 <a:ea typeface="+mn-lt"/>
                 <a:cs typeface="+mn-lt"/>
               </a:rPr>
-              <a:t>system</a:t>
+              <a:t>Pick and Ban system</a:t>
             </a:r>
-            <a:endParaRPr lang="ko-KR" dirty="0" err="1"/>
+            <a:endParaRPr lang="ko-KR" dirty="0"/>
           </a:p>
           <a:p>
             <a:r>
-              <a:rPr lang="ko-KR" dirty="0" err="1">
+              <a:rPr lang="ko-KR" dirty="0">
                 <a:ea typeface="+mn-lt"/>
                 <a:cs typeface="+mn-lt"/>
               </a:rPr>
               <a:t>Balancing</a:t>
             </a:r>
-            <a:endParaRPr lang="ko-KR" dirty="0" err="1"/>
+            <a:endParaRPr lang="ko-KR" dirty="0"/>
           </a:p>
         </p:txBody>
       </p:sp>
@@ -5893,26 +5973,11 @@
           <a:lstStyle/>
           <a:p>
             <a:r>
-              <a:rPr lang="ko-KR" altLang="en-US" dirty="0" err="1">
-                <a:ea typeface="맑은 고딕"/>
-              </a:rPr>
-              <a:t>Zombies</a:t>
-            </a:r>
-            <a:r>
               <a:rPr lang="ko-KR" altLang="en-US" dirty="0">
                 <a:ea typeface="맑은 고딕"/>
               </a:rPr>
-              <a:t> </a:t>
+              <a:t>Zombies movement</a:t>
             </a:r>
-            <a:r>
-              <a:rPr lang="ko-KR" altLang="en-US" dirty="0" err="1">
-                <a:ea typeface="맑은 고딕"/>
-              </a:rPr>
-              <a:t>movement</a:t>
-            </a:r>
-            <a:endParaRPr lang="ko-KR" altLang="en-US" dirty="0">
-              <a:ea typeface="맑은 고딕"/>
-            </a:endParaRPr>
           </a:p>
         </p:txBody>
       </p:sp>
@@ -7903,126 +7968,6 @@
           </p:spPr>
         </p:pic>
       </p:grpSp>
-      <p:pic>
-        <p:nvPicPr>
-          <p:cNvPr id="90" name="그림 89">
-            <a:extLst>
-              <a:ext uri="{FF2B5EF4-FFF2-40B4-BE49-F238E27FC236}">
-                <a16:creationId xmlns:a16="http://schemas.microsoft.com/office/drawing/2014/main" id="{0AF83807-D9AC-44BE-8793-9332C79C303D}"/>
-              </a:ext>
-            </a:extLst>
-          </p:cNvPr>
-          <p:cNvPicPr>
-            <a:picLocks noChangeAspect="1"/>
-          </p:cNvPicPr>
-          <p:nvPr/>
-        </p:nvPicPr>
-        <p:blipFill>
-          <a:blip r:embed="rId3"/>
-          <a:stretch>
-            <a:fillRect/>
-          </a:stretch>
-        </p:blipFill>
-        <p:spPr>
-          <a:xfrm>
-            <a:off x="956537" y="1876881"/>
-            <a:ext cx="321202" cy="446114"/>
-          </a:xfrm>
-          <a:prstGeom prst="rect">
-            <a:avLst/>
-          </a:prstGeom>
-        </p:spPr>
-      </p:pic>
-      <p:pic>
-        <p:nvPicPr>
-          <p:cNvPr id="91" name="그림 90">
-            <a:extLst>
-              <a:ext uri="{FF2B5EF4-FFF2-40B4-BE49-F238E27FC236}">
-                <a16:creationId xmlns:a16="http://schemas.microsoft.com/office/drawing/2014/main" id="{47F5FA23-CDA7-4F68-91C0-8A0058FA536E}"/>
-              </a:ext>
-            </a:extLst>
-          </p:cNvPr>
-          <p:cNvPicPr>
-            <a:picLocks noChangeAspect="1"/>
-          </p:cNvPicPr>
-          <p:nvPr/>
-        </p:nvPicPr>
-        <p:blipFill>
-          <a:blip r:embed="rId3"/>
-          <a:stretch>
-            <a:fillRect/>
-          </a:stretch>
-        </p:blipFill>
-        <p:spPr>
-          <a:xfrm>
-            <a:off x="980302" y="3420264"/>
-            <a:ext cx="321202" cy="446114"/>
-          </a:xfrm>
-          <a:prstGeom prst="rect">
-            <a:avLst/>
-          </a:prstGeom>
-        </p:spPr>
-      </p:pic>
-      <p:pic>
-        <p:nvPicPr>
-          <p:cNvPr id="92" name="그림 91">
-            <a:extLst>
-              <a:ext uri="{FF2B5EF4-FFF2-40B4-BE49-F238E27FC236}">
-                <a16:creationId xmlns:a16="http://schemas.microsoft.com/office/drawing/2014/main" id="{77FA0065-6F25-4175-96AD-39CD883F688C}"/>
-              </a:ext>
-            </a:extLst>
-          </p:cNvPr>
-          <p:cNvPicPr>
-            <a:picLocks noChangeAspect="1"/>
-          </p:cNvPicPr>
-          <p:nvPr/>
-        </p:nvPicPr>
-        <p:blipFill>
-          <a:blip r:embed="rId3"/>
-          <a:stretch>
-            <a:fillRect/>
-          </a:stretch>
-        </p:blipFill>
-        <p:spPr>
-          <a:xfrm>
-            <a:off x="955590" y="4204299"/>
-            <a:ext cx="321202" cy="446114"/>
-          </a:xfrm>
-          <a:prstGeom prst="rect">
-            <a:avLst/>
-          </a:prstGeom>
-        </p:spPr>
-      </p:pic>
-      <p:pic>
-        <p:nvPicPr>
-          <p:cNvPr id="93" name="그림 92">
-            <a:extLst>
-              <a:ext uri="{FF2B5EF4-FFF2-40B4-BE49-F238E27FC236}">
-                <a16:creationId xmlns:a16="http://schemas.microsoft.com/office/drawing/2014/main" id="{5E25A1D9-00CF-4D0F-8FDD-273A90B28E0A}"/>
-              </a:ext>
-            </a:extLst>
-          </p:cNvPr>
-          <p:cNvPicPr>
-            <a:picLocks noChangeAspect="1"/>
-          </p:cNvPicPr>
-          <p:nvPr/>
-        </p:nvPicPr>
-        <p:blipFill>
-          <a:blip r:embed="rId3"/>
-          <a:stretch>
-            <a:fillRect/>
-          </a:stretch>
-        </p:blipFill>
-        <p:spPr>
-          <a:xfrm>
-            <a:off x="1033885" y="908200"/>
-            <a:ext cx="321202" cy="446114"/>
-          </a:xfrm>
-          <a:prstGeom prst="rect">
-            <a:avLst/>
-          </a:prstGeom>
-        </p:spPr>
-      </p:pic>
       <p:sp>
         <p:nvSpPr>
           <p:cNvPr id="2" name="제목 1">
@@ -8088,6 +8033,150 @@
           </a:p>
         </p:txBody>
       </p:sp>
+      <p:pic>
+        <p:nvPicPr>
+          <p:cNvPr id="4" name="그림 3">
+            <a:extLst>
+              <a:ext uri="{FF2B5EF4-FFF2-40B4-BE49-F238E27FC236}">
+                <a16:creationId xmlns:a16="http://schemas.microsoft.com/office/drawing/2014/main" id="{0E6CF244-18F4-4917-9CA2-7121C9822BA1}"/>
+              </a:ext>
+            </a:extLst>
+          </p:cNvPr>
+          <p:cNvPicPr>
+            <a:picLocks noChangeAspect="1"/>
+          </p:cNvPicPr>
+          <p:nvPr/>
+        </p:nvPicPr>
+        <p:blipFill>
+          <a:blip r:embed="rId3">
+            <a:extLst>
+              <a:ext uri="{28A0092B-C50C-407E-A947-70E740481C1C}">
+                <a14:useLocalDpi xmlns:a14="http://schemas.microsoft.com/office/drawing/2010/main" val="0"/>
+              </a:ext>
+            </a:extLst>
+          </a:blip>
+          <a:stretch>
+            <a:fillRect/>
+          </a:stretch>
+        </p:blipFill>
+        <p:spPr>
+          <a:xfrm>
+            <a:off x="1050324" y="767036"/>
+            <a:ext cx="304800" cy="609600"/>
+          </a:xfrm>
+          <a:prstGeom prst="rect">
+            <a:avLst/>
+          </a:prstGeom>
+        </p:spPr>
+      </p:pic>
+      <p:pic>
+        <p:nvPicPr>
+          <p:cNvPr id="8" name="그림 7">
+            <a:extLst>
+              <a:ext uri="{FF2B5EF4-FFF2-40B4-BE49-F238E27FC236}">
+                <a16:creationId xmlns:a16="http://schemas.microsoft.com/office/drawing/2014/main" id="{BE100982-E7CA-45C4-96DE-F27B8DD628B3}"/>
+              </a:ext>
+            </a:extLst>
+          </p:cNvPr>
+          <p:cNvPicPr>
+            <a:picLocks noChangeAspect="1"/>
+          </p:cNvPicPr>
+          <p:nvPr/>
+        </p:nvPicPr>
+        <p:blipFill>
+          <a:blip r:embed="rId4">
+            <a:extLst>
+              <a:ext uri="{28A0092B-C50C-407E-A947-70E740481C1C}">
+                <a14:useLocalDpi xmlns:a14="http://schemas.microsoft.com/office/drawing/2010/main" val="0"/>
+              </a:ext>
+            </a:extLst>
+          </a:blip>
+          <a:stretch>
+            <a:fillRect/>
+          </a:stretch>
+        </p:blipFill>
+        <p:spPr>
+          <a:xfrm>
+            <a:off x="1058562" y="1651382"/>
+            <a:ext cx="304800" cy="609600"/>
+          </a:xfrm>
+          <a:prstGeom prst="rect">
+            <a:avLst/>
+          </a:prstGeom>
+        </p:spPr>
+      </p:pic>
+      <p:pic>
+        <p:nvPicPr>
+          <p:cNvPr id="12" name="그림 11">
+            <a:extLst>
+              <a:ext uri="{FF2B5EF4-FFF2-40B4-BE49-F238E27FC236}">
+                <a16:creationId xmlns:a16="http://schemas.microsoft.com/office/drawing/2014/main" id="{9CF77B1B-88AC-4082-8518-0B8F3EE01F70}"/>
+              </a:ext>
+            </a:extLst>
+          </p:cNvPr>
+          <p:cNvPicPr>
+            <a:picLocks noChangeAspect="1"/>
+          </p:cNvPicPr>
+          <p:nvPr/>
+        </p:nvPicPr>
+        <p:blipFill>
+          <a:blip r:embed="rId5">
+            <a:extLst>
+              <a:ext uri="{28A0092B-C50C-407E-A947-70E740481C1C}">
+                <a14:useLocalDpi xmlns:a14="http://schemas.microsoft.com/office/drawing/2010/main" val="0"/>
+              </a:ext>
+            </a:extLst>
+          </a:blip>
+          <a:stretch>
+            <a:fillRect/>
+          </a:stretch>
+        </p:blipFill>
+        <p:spPr>
+          <a:xfrm>
+            <a:off x="1128584" y="4136598"/>
+            <a:ext cx="304800" cy="609600"/>
+          </a:xfrm>
+          <a:prstGeom prst="rect">
+            <a:avLst/>
+          </a:prstGeom>
+        </p:spPr>
+      </p:pic>
+      <p:pic>
+        <p:nvPicPr>
+          <p:cNvPr id="16" name="그림 15">
+            <a:extLst>
+              <a:ext uri="{FF2B5EF4-FFF2-40B4-BE49-F238E27FC236}">
+                <a16:creationId xmlns:a16="http://schemas.microsoft.com/office/drawing/2014/main" id="{1489B055-D3DE-46F6-B9A6-D4E4D5188466}"/>
+              </a:ext>
+            </a:extLst>
+          </p:cNvPr>
+          <p:cNvPicPr>
+            <a:picLocks noChangeAspect="1"/>
+          </p:cNvPicPr>
+          <p:nvPr/>
+        </p:nvPicPr>
+        <p:blipFill>
+          <a:blip r:embed="rId6">
+            <a:extLst>
+              <a:ext uri="{28A0092B-C50C-407E-A947-70E740481C1C}">
+                <a14:useLocalDpi xmlns:a14="http://schemas.microsoft.com/office/drawing/2010/main" val="0"/>
+              </a:ext>
+            </a:extLst>
+          </a:blip>
+          <a:stretch>
+            <a:fillRect/>
+          </a:stretch>
+        </p:blipFill>
+        <p:spPr>
+          <a:xfrm>
+            <a:off x="1101873" y="3276483"/>
+            <a:ext cx="304800" cy="609600"/>
+          </a:xfrm>
+          <a:prstGeom prst="rect">
+            <a:avLst/>
+          </a:prstGeom>
+        </p:spPr>
+      </p:pic>
     </p:spTree>
     <p:extLst>
       <p:ext uri="{BB962C8B-B14F-4D97-AF65-F5344CB8AC3E}">
@@ -9709,126 +9798,6 @@
           </p:spPr>
         </p:pic>
       </p:grpSp>
-      <p:pic>
-        <p:nvPicPr>
-          <p:cNvPr id="39" name="그림 38">
-            <a:extLst>
-              <a:ext uri="{FF2B5EF4-FFF2-40B4-BE49-F238E27FC236}">
-                <a16:creationId xmlns:a16="http://schemas.microsoft.com/office/drawing/2014/main" id="{34EB6B3C-E7D1-4BB9-AE3F-297B7FA060C3}"/>
-              </a:ext>
-            </a:extLst>
-          </p:cNvPr>
-          <p:cNvPicPr>
-            <a:picLocks noChangeAspect="1"/>
-          </p:cNvPicPr>
-          <p:nvPr/>
-        </p:nvPicPr>
-        <p:blipFill>
-          <a:blip r:embed="rId3"/>
-          <a:stretch>
-            <a:fillRect/>
-          </a:stretch>
-        </p:blipFill>
-        <p:spPr>
-          <a:xfrm>
-            <a:off x="992117" y="2263540"/>
-            <a:ext cx="321202" cy="446114"/>
-          </a:xfrm>
-          <a:prstGeom prst="rect">
-            <a:avLst/>
-          </a:prstGeom>
-        </p:spPr>
-      </p:pic>
-      <p:pic>
-        <p:nvPicPr>
-          <p:cNvPr id="40" name="그림 39">
-            <a:extLst>
-              <a:ext uri="{FF2B5EF4-FFF2-40B4-BE49-F238E27FC236}">
-                <a16:creationId xmlns:a16="http://schemas.microsoft.com/office/drawing/2014/main" id="{DFE3BF2A-3C57-45AE-B222-B1427E2C1CF6}"/>
-              </a:ext>
-            </a:extLst>
-          </p:cNvPr>
-          <p:cNvPicPr>
-            <a:picLocks noChangeAspect="1"/>
-          </p:cNvPicPr>
-          <p:nvPr/>
-        </p:nvPicPr>
-        <p:blipFill>
-          <a:blip r:embed="rId3"/>
-          <a:stretch>
-            <a:fillRect/>
-          </a:stretch>
-        </p:blipFill>
-        <p:spPr>
-          <a:xfrm>
-            <a:off x="988613" y="3791047"/>
-            <a:ext cx="321202" cy="446114"/>
-          </a:xfrm>
-          <a:prstGeom prst="rect">
-            <a:avLst/>
-          </a:prstGeom>
-        </p:spPr>
-      </p:pic>
-      <p:pic>
-        <p:nvPicPr>
-          <p:cNvPr id="41" name="그림 40">
-            <a:extLst>
-              <a:ext uri="{FF2B5EF4-FFF2-40B4-BE49-F238E27FC236}">
-                <a16:creationId xmlns:a16="http://schemas.microsoft.com/office/drawing/2014/main" id="{DC1EA012-FFE5-4E84-A8C7-C5596D2D0790}"/>
-              </a:ext>
-            </a:extLst>
-          </p:cNvPr>
-          <p:cNvPicPr>
-            <a:picLocks noChangeAspect="1"/>
-          </p:cNvPicPr>
-          <p:nvPr/>
-        </p:nvPicPr>
-        <p:blipFill>
-          <a:blip r:embed="rId3"/>
-          <a:stretch>
-            <a:fillRect/>
-          </a:stretch>
-        </p:blipFill>
-        <p:spPr>
-          <a:xfrm>
-            <a:off x="972065" y="4542174"/>
-            <a:ext cx="321202" cy="446114"/>
-          </a:xfrm>
-          <a:prstGeom prst="rect">
-            <a:avLst/>
-          </a:prstGeom>
-        </p:spPr>
-      </p:pic>
-      <p:pic>
-        <p:nvPicPr>
-          <p:cNvPr id="42" name="그림 41">
-            <a:extLst>
-              <a:ext uri="{FF2B5EF4-FFF2-40B4-BE49-F238E27FC236}">
-                <a16:creationId xmlns:a16="http://schemas.microsoft.com/office/drawing/2014/main" id="{257D61FA-A6B2-4192-BDAA-AFDA54515DA6}"/>
-              </a:ext>
-            </a:extLst>
-          </p:cNvPr>
-          <p:cNvPicPr>
-            <a:picLocks noChangeAspect="1"/>
-          </p:cNvPicPr>
-          <p:nvPr/>
-        </p:nvPicPr>
-        <p:blipFill>
-          <a:blip r:embed="rId3"/>
-          <a:stretch>
-            <a:fillRect/>
-          </a:stretch>
-        </p:blipFill>
-        <p:spPr>
-          <a:xfrm>
-            <a:off x="1103871" y="1222546"/>
-            <a:ext cx="321202" cy="446114"/>
-          </a:xfrm>
-          <a:prstGeom prst="rect">
-            <a:avLst/>
-          </a:prstGeom>
-        </p:spPr>
-      </p:pic>
       <p:sp>
         <p:nvSpPr>
           <p:cNvPr id="2" name="제목 1">
@@ -9856,38 +9825,158 @@
           <a:lstStyle/>
           <a:p>
             <a:r>
-              <a:rPr lang="ko-KR" altLang="en-US" dirty="0" err="1">
-                <a:ea typeface="맑은 고딕"/>
-              </a:rPr>
-              <a:t>Pick</a:t>
-            </a:r>
-            <a:r>
               <a:rPr lang="ko-KR" altLang="en-US" dirty="0">
                 <a:ea typeface="맑은 고딕"/>
               </a:rPr>
-              <a:t> and </a:t>
-            </a:r>
-            <a:r>
-              <a:rPr lang="ko-KR" altLang="en-US" dirty="0" err="1">
-                <a:ea typeface="맑은 고딕"/>
-              </a:rPr>
-              <a:t>Ban</a:t>
-            </a:r>
-            <a:r>
-              <a:rPr lang="ko-KR" altLang="en-US" dirty="0">
-                <a:ea typeface="맑은 고딕"/>
-              </a:rPr>
-              <a:t> </a:t>
-            </a:r>
-            <a:r>
-              <a:rPr lang="ko-KR" altLang="en-US" dirty="0" err="1">
-                <a:ea typeface="맑은 고딕"/>
-              </a:rPr>
-              <a:t>system</a:t>
+              <a:t>Pick and Ban system</a:t>
             </a:r>
           </a:p>
         </p:txBody>
       </p:sp>
+      <p:pic>
+        <p:nvPicPr>
+          <p:cNvPr id="47" name="그림 46">
+            <a:extLst>
+              <a:ext uri="{FF2B5EF4-FFF2-40B4-BE49-F238E27FC236}">
+                <a16:creationId xmlns:a16="http://schemas.microsoft.com/office/drawing/2014/main" id="{1879A1DE-2541-414F-A04F-4670185C3A1B}"/>
+              </a:ext>
+            </a:extLst>
+          </p:cNvPr>
+          <p:cNvPicPr>
+            <a:picLocks noChangeAspect="1"/>
+          </p:cNvPicPr>
+          <p:nvPr/>
+        </p:nvPicPr>
+        <p:blipFill>
+          <a:blip r:embed="rId3">
+            <a:extLst>
+              <a:ext uri="{28A0092B-C50C-407E-A947-70E740481C1C}">
+                <a14:useLocalDpi xmlns:a14="http://schemas.microsoft.com/office/drawing/2010/main" val="0"/>
+              </a:ext>
+            </a:extLst>
+          </a:blip>
+          <a:stretch>
+            <a:fillRect/>
+          </a:stretch>
+        </p:blipFill>
+        <p:spPr>
+          <a:xfrm>
+            <a:off x="1132703" y="1079671"/>
+            <a:ext cx="304800" cy="609600"/>
+          </a:xfrm>
+          <a:prstGeom prst="rect">
+            <a:avLst/>
+          </a:prstGeom>
+        </p:spPr>
+      </p:pic>
+      <p:pic>
+        <p:nvPicPr>
+          <p:cNvPr id="48" name="그림 47">
+            <a:extLst>
+              <a:ext uri="{FF2B5EF4-FFF2-40B4-BE49-F238E27FC236}">
+                <a16:creationId xmlns:a16="http://schemas.microsoft.com/office/drawing/2014/main" id="{CEFA87CA-ACD1-425F-98EE-FBF05133B795}"/>
+              </a:ext>
+            </a:extLst>
+          </p:cNvPr>
+          <p:cNvPicPr>
+            <a:picLocks noChangeAspect="1"/>
+          </p:cNvPicPr>
+          <p:nvPr/>
+        </p:nvPicPr>
+        <p:blipFill>
+          <a:blip r:embed="rId4">
+            <a:extLst>
+              <a:ext uri="{28A0092B-C50C-407E-A947-70E740481C1C}">
+                <a14:useLocalDpi xmlns:a14="http://schemas.microsoft.com/office/drawing/2010/main" val="0"/>
+              </a:ext>
+            </a:extLst>
+          </a:blip>
+          <a:stretch>
+            <a:fillRect/>
+          </a:stretch>
+        </p:blipFill>
+        <p:spPr>
+          <a:xfrm>
+            <a:off x="1140941" y="1964017"/>
+            <a:ext cx="304800" cy="609600"/>
+          </a:xfrm>
+          <a:prstGeom prst="rect">
+            <a:avLst/>
+          </a:prstGeom>
+        </p:spPr>
+      </p:pic>
+      <p:pic>
+        <p:nvPicPr>
+          <p:cNvPr id="49" name="그림 48">
+            <a:extLst>
+              <a:ext uri="{FF2B5EF4-FFF2-40B4-BE49-F238E27FC236}">
+                <a16:creationId xmlns:a16="http://schemas.microsoft.com/office/drawing/2014/main" id="{33C50761-B9D3-42CD-BFFE-18575899D6DC}"/>
+              </a:ext>
+            </a:extLst>
+          </p:cNvPr>
+          <p:cNvPicPr>
+            <a:picLocks noChangeAspect="1"/>
+          </p:cNvPicPr>
+          <p:nvPr/>
+        </p:nvPicPr>
+        <p:blipFill>
+          <a:blip r:embed="rId5">
+            <a:extLst>
+              <a:ext uri="{28A0092B-C50C-407E-A947-70E740481C1C}">
+                <a14:useLocalDpi xmlns:a14="http://schemas.microsoft.com/office/drawing/2010/main" val="0"/>
+              </a:ext>
+            </a:extLst>
+          </a:blip>
+          <a:stretch>
+            <a:fillRect/>
+          </a:stretch>
+        </p:blipFill>
+        <p:spPr>
+          <a:xfrm>
+            <a:off x="1210963" y="4449233"/>
+            <a:ext cx="304800" cy="609600"/>
+          </a:xfrm>
+          <a:prstGeom prst="rect">
+            <a:avLst/>
+          </a:prstGeom>
+        </p:spPr>
+      </p:pic>
+      <p:pic>
+        <p:nvPicPr>
+          <p:cNvPr id="50" name="그림 49">
+            <a:extLst>
+              <a:ext uri="{FF2B5EF4-FFF2-40B4-BE49-F238E27FC236}">
+                <a16:creationId xmlns:a16="http://schemas.microsoft.com/office/drawing/2014/main" id="{7F2A389E-8404-44A4-8690-E26606D98185}"/>
+              </a:ext>
+            </a:extLst>
+          </p:cNvPr>
+          <p:cNvPicPr>
+            <a:picLocks noChangeAspect="1"/>
+          </p:cNvPicPr>
+          <p:nvPr/>
+        </p:nvPicPr>
+        <p:blipFill>
+          <a:blip r:embed="rId6">
+            <a:extLst>
+              <a:ext uri="{28A0092B-C50C-407E-A947-70E740481C1C}">
+                <a14:useLocalDpi xmlns:a14="http://schemas.microsoft.com/office/drawing/2010/main" val="0"/>
+              </a:ext>
+            </a:extLst>
+          </a:blip>
+          <a:stretch>
+            <a:fillRect/>
+          </a:stretch>
+        </p:blipFill>
+        <p:spPr>
+          <a:xfrm>
+            <a:off x="1184252" y="3589118"/>
+            <a:ext cx="304800" cy="609600"/>
+          </a:xfrm>
+          <a:prstGeom prst="rect">
+            <a:avLst/>
+          </a:prstGeom>
+        </p:spPr>
+      </p:pic>
     </p:spTree>
     <p:extLst>
       <p:ext uri="{BB962C8B-B14F-4D97-AF65-F5344CB8AC3E}">
@@ -10461,7 +10550,7 @@
                     <a:lstStyle/>
                     <a:p>
                       <a:pPr latinLnBrk="1"/>
-                      <a:endParaRPr lang="ko-KR" altLang="en-US"/>
+                      <a:endParaRPr lang="ko-KR" altLang="en-US" dirty="0"/>
                     </a:p>
                   </a:txBody>
                   <a:tcPr/>
@@ -11635,10 +11724,10 @@
       </p:sp>
       <p:pic>
         <p:nvPicPr>
-          <p:cNvPr id="41" name="그림 40">
-            <a:extLst>
-              <a:ext uri="{FF2B5EF4-FFF2-40B4-BE49-F238E27FC236}">
-                <a16:creationId xmlns:a16="http://schemas.microsoft.com/office/drawing/2014/main" id="{15233880-F4E0-4337-A500-E20FDC77E0C8}"/>
+          <p:cNvPr id="36" name="그림 35">
+            <a:extLst>
+              <a:ext uri="{FF2B5EF4-FFF2-40B4-BE49-F238E27FC236}">
+                <a16:creationId xmlns:a16="http://schemas.microsoft.com/office/drawing/2014/main" id="{EEA1850D-FE5A-453F-9C57-D8A58401FA17}"/>
               </a:ext>
             </a:extLst>
           </p:cNvPr>
@@ -11648,15 +11737,21 @@
           <p:nvPr/>
         </p:nvPicPr>
         <p:blipFill>
-          <a:blip r:embed="rId3"/>
+          <a:blip r:embed="rId3">
+            <a:extLst>
+              <a:ext uri="{28A0092B-C50C-407E-A947-70E740481C1C}">
+                <a14:useLocalDpi xmlns:a14="http://schemas.microsoft.com/office/drawing/2010/main" val="0"/>
+              </a:ext>
+            </a:extLst>
+          </a:blip>
           <a:stretch>
             <a:fillRect/>
           </a:stretch>
         </p:blipFill>
         <p:spPr>
           <a:xfrm>
-            <a:off x="1121388" y="2294074"/>
-            <a:ext cx="321202" cy="446114"/>
+            <a:off x="1125108" y="1084820"/>
+            <a:ext cx="304800" cy="609600"/>
           </a:xfrm>
           <a:prstGeom prst="rect">
             <a:avLst/>
@@ -11665,10 +11760,10 @@
       </p:pic>
       <p:pic>
         <p:nvPicPr>
-          <p:cNvPr id="42" name="그림 41">
-            <a:extLst>
-              <a:ext uri="{FF2B5EF4-FFF2-40B4-BE49-F238E27FC236}">
-                <a16:creationId xmlns:a16="http://schemas.microsoft.com/office/drawing/2014/main" id="{515BD7B2-DF08-42AE-9923-B61BCEB445F6}"/>
+          <p:cNvPr id="38" name="그림 37">
+            <a:extLst>
+              <a:ext uri="{FF2B5EF4-FFF2-40B4-BE49-F238E27FC236}">
+                <a16:creationId xmlns:a16="http://schemas.microsoft.com/office/drawing/2014/main" id="{1C1D4672-E2CA-480B-8EC2-DA0C341B490B}"/>
               </a:ext>
             </a:extLst>
           </p:cNvPr>
@@ -11678,15 +11773,21 @@
           <p:nvPr/>
         </p:nvPicPr>
         <p:blipFill>
-          <a:blip r:embed="rId3"/>
+          <a:blip r:embed="rId4">
+            <a:extLst>
+              <a:ext uri="{28A0092B-C50C-407E-A947-70E740481C1C}">
+                <a14:useLocalDpi xmlns:a14="http://schemas.microsoft.com/office/drawing/2010/main" val="0"/>
+              </a:ext>
+            </a:extLst>
+          </a:blip>
           <a:stretch>
             <a:fillRect/>
           </a:stretch>
         </p:blipFill>
         <p:spPr>
           <a:xfrm>
-            <a:off x="1145153" y="3837457"/>
-            <a:ext cx="321202" cy="446114"/>
+            <a:off x="1133346" y="1969166"/>
+            <a:ext cx="304800" cy="609600"/>
           </a:xfrm>
           <a:prstGeom prst="rect">
             <a:avLst/>
@@ -11695,10 +11796,10 @@
       </p:pic>
       <p:pic>
         <p:nvPicPr>
-          <p:cNvPr id="43" name="그림 42">
-            <a:extLst>
-              <a:ext uri="{FF2B5EF4-FFF2-40B4-BE49-F238E27FC236}">
-                <a16:creationId xmlns:a16="http://schemas.microsoft.com/office/drawing/2014/main" id="{BC47DED8-196E-47DA-97F6-3AE717111D88}"/>
+          <p:cNvPr id="45" name="그림 44">
+            <a:extLst>
+              <a:ext uri="{FF2B5EF4-FFF2-40B4-BE49-F238E27FC236}">
+                <a16:creationId xmlns:a16="http://schemas.microsoft.com/office/drawing/2014/main" id="{9B8CB750-323D-4930-BC98-98CD0D4A629D}"/>
               </a:ext>
             </a:extLst>
           </p:cNvPr>
@@ -11708,15 +11809,21 @@
           <p:nvPr/>
         </p:nvPicPr>
         <p:blipFill>
-          <a:blip r:embed="rId3"/>
+          <a:blip r:embed="rId5">
+            <a:extLst>
+              <a:ext uri="{28A0092B-C50C-407E-A947-70E740481C1C}">
+                <a14:useLocalDpi xmlns:a14="http://schemas.microsoft.com/office/drawing/2010/main" val="0"/>
+              </a:ext>
+            </a:extLst>
+          </a:blip>
           <a:stretch>
             <a:fillRect/>
           </a:stretch>
         </p:blipFill>
         <p:spPr>
           <a:xfrm>
-            <a:off x="1120441" y="4621492"/>
-            <a:ext cx="321202" cy="446114"/>
+            <a:off x="1203368" y="4454382"/>
+            <a:ext cx="304800" cy="609600"/>
           </a:xfrm>
           <a:prstGeom prst="rect">
             <a:avLst/>
@@ -11725,10 +11832,10 @@
       </p:pic>
       <p:pic>
         <p:nvPicPr>
-          <p:cNvPr id="44" name="그림 43">
-            <a:extLst>
-              <a:ext uri="{FF2B5EF4-FFF2-40B4-BE49-F238E27FC236}">
-                <a16:creationId xmlns:a16="http://schemas.microsoft.com/office/drawing/2014/main" id="{B3C89FD6-231C-4EAD-8F68-4C54297E3AFA}"/>
+          <p:cNvPr id="46" name="그림 45">
+            <a:extLst>
+              <a:ext uri="{FF2B5EF4-FFF2-40B4-BE49-F238E27FC236}">
+                <a16:creationId xmlns:a16="http://schemas.microsoft.com/office/drawing/2014/main" id="{5448DEB3-3ED7-4CD3-834C-A667D9490578}"/>
               </a:ext>
             </a:extLst>
           </p:cNvPr>
@@ -11738,15 +11845,21 @@
           <p:nvPr/>
         </p:nvPicPr>
         <p:blipFill>
-          <a:blip r:embed="rId3"/>
+          <a:blip r:embed="rId6">
+            <a:extLst>
+              <a:ext uri="{28A0092B-C50C-407E-A947-70E740481C1C}">
+                <a14:useLocalDpi xmlns:a14="http://schemas.microsoft.com/office/drawing/2010/main" val="0"/>
+              </a:ext>
+            </a:extLst>
+          </a:blip>
           <a:stretch>
             <a:fillRect/>
           </a:stretch>
         </p:blipFill>
         <p:spPr>
           <a:xfrm>
-            <a:off x="1198736" y="1325393"/>
-            <a:ext cx="321202" cy="446114"/>
+            <a:off x="1176657" y="3594267"/>
+            <a:ext cx="304800" cy="609600"/>
           </a:xfrm>
           <a:prstGeom prst="rect">
             <a:avLst/>

</xml_diff>